<commit_message>
Done more updates to things.  This is a commit before I change the background/font/colour to try and differentiate it from the 6 month review.
</commit_message>
<xml_diff>
--- a/ASA2017/Session9_Seiler_Jacob.pptx
+++ b/ASA2017/Session9_Seiler_Jacob.pptx
@@ -209,7 +209,7 @@
           <a:p>
             <a:fld id="{B0F99F05-9BA7-0847-82B3-941D753A8295}" type="datetimeFigureOut">
               <a:rPr lang="en-US" smtClean="0"/>
-              <a:t>7/10/17</a:t>
+              <a:t>8/22/17</a:t>
             </a:fld>
             <a:endParaRPr lang="en-US"/>
           </a:p>
@@ -1890,7 +1890,7 @@
           <a:p>
             <a:fld id="{EA785BD0-C8B6-E541-8957-C258C7E4C40C}" type="datetimeFigureOut">
               <a:rPr lang="en-US" smtClean="0"/>
-              <a:t>7/10/17</a:t>
+              <a:t>8/22/17</a:t>
             </a:fld>
             <a:endParaRPr lang="en-US"/>
           </a:p>
@@ -2060,7 +2060,7 @@
           <a:p>
             <a:fld id="{EA785BD0-C8B6-E541-8957-C258C7E4C40C}" type="datetimeFigureOut">
               <a:rPr lang="en-US" smtClean="0"/>
-              <a:t>7/10/17</a:t>
+              <a:t>8/22/17</a:t>
             </a:fld>
             <a:endParaRPr lang="en-US"/>
           </a:p>
@@ -2240,7 +2240,7 @@
           <a:p>
             <a:fld id="{EA785BD0-C8B6-E541-8957-C258C7E4C40C}" type="datetimeFigureOut">
               <a:rPr lang="en-US" smtClean="0"/>
-              <a:t>7/10/17</a:t>
+              <a:t>8/22/17</a:t>
             </a:fld>
             <a:endParaRPr lang="en-US"/>
           </a:p>
@@ -2410,7 +2410,7 @@
           <a:p>
             <a:fld id="{EA785BD0-C8B6-E541-8957-C258C7E4C40C}" type="datetimeFigureOut">
               <a:rPr lang="en-US" smtClean="0"/>
-              <a:t>7/10/17</a:t>
+              <a:t>8/22/17</a:t>
             </a:fld>
             <a:endParaRPr lang="en-US"/>
           </a:p>
@@ -2656,7 +2656,7 @@
           <a:p>
             <a:fld id="{EA785BD0-C8B6-E541-8957-C258C7E4C40C}" type="datetimeFigureOut">
               <a:rPr lang="en-US" smtClean="0"/>
-              <a:t>7/10/17</a:t>
+              <a:t>8/22/17</a:t>
             </a:fld>
             <a:endParaRPr lang="en-US"/>
           </a:p>
@@ -2888,7 +2888,7 @@
           <a:p>
             <a:fld id="{EA785BD0-C8B6-E541-8957-C258C7E4C40C}" type="datetimeFigureOut">
               <a:rPr lang="en-US" smtClean="0"/>
-              <a:t>7/10/17</a:t>
+              <a:t>8/22/17</a:t>
             </a:fld>
             <a:endParaRPr lang="en-US"/>
           </a:p>
@@ -3255,7 +3255,7 @@
           <a:p>
             <a:fld id="{EA785BD0-C8B6-E541-8957-C258C7E4C40C}" type="datetimeFigureOut">
               <a:rPr lang="en-US" smtClean="0"/>
-              <a:t>7/10/17</a:t>
+              <a:t>8/22/17</a:t>
             </a:fld>
             <a:endParaRPr lang="en-US"/>
           </a:p>
@@ -3373,7 +3373,7 @@
           <a:p>
             <a:fld id="{EA785BD0-C8B6-E541-8957-C258C7E4C40C}" type="datetimeFigureOut">
               <a:rPr lang="en-US" smtClean="0"/>
-              <a:t>7/10/17</a:t>
+              <a:t>8/22/17</a:t>
             </a:fld>
             <a:endParaRPr lang="en-US"/>
           </a:p>
@@ -3468,7 +3468,7 @@
           <a:p>
             <a:fld id="{EA785BD0-C8B6-E541-8957-C258C7E4C40C}" type="datetimeFigureOut">
               <a:rPr lang="en-US" smtClean="0"/>
-              <a:t>7/10/17</a:t>
+              <a:t>8/22/17</a:t>
             </a:fld>
             <a:endParaRPr lang="en-US"/>
           </a:p>
@@ -3745,7 +3745,7 @@
           <a:p>
             <a:fld id="{EA785BD0-C8B6-E541-8957-C258C7E4C40C}" type="datetimeFigureOut">
               <a:rPr lang="en-US" smtClean="0"/>
-              <a:t>7/10/17</a:t>
+              <a:t>8/22/17</a:t>
             </a:fld>
             <a:endParaRPr lang="en-US"/>
           </a:p>
@@ -3998,7 +3998,7 @@
           <a:p>
             <a:fld id="{EA785BD0-C8B6-E541-8957-C258C7E4C40C}" type="datetimeFigureOut">
               <a:rPr lang="en-US" smtClean="0"/>
-              <a:t>7/10/17</a:t>
+              <a:t>8/22/17</a:t>
             </a:fld>
             <a:endParaRPr lang="en-US"/>
           </a:p>
@@ -4220,7 +4220,7 @@
           <a:p>
             <a:fld id="{EA785BD0-C8B6-E541-8957-C258C7E4C40C}" type="datetimeFigureOut">
               <a:rPr lang="en-US" smtClean="0"/>
-              <a:t>7/10/17</a:t>
+              <a:t>8/22/17</a:t>
             </a:fld>
             <a:endParaRPr lang="en-US"/>
           </a:p>

</xml_diff>